<commit_message>
Segragated each battery data from 3 battery hours Bytebeam data and stored it in a separate excel file!
</commit_message>
<xml_diff>
--- a/Automationdashboard/MAIN_FOLDER/Automation_Dashboard_Batterywise/V4/D11_03_2024/B3_B03_13.15_15.30/analysis_B3_B03_13.15_15.30.pptx
+++ b/Automationdashboard/MAIN_FOLDER/Automation_Dashboard_Batterywise/V4/D11_03_2024/B3_B03_13.15_15.30/analysis_B3_B03_13.15_15.30.pptx
@@ -3376,6 +3376,32 @@
                     <a:lstStyle/>
                     <a:p>
                       <a:r>
+                        <a:t>97.0</a:t>
+                      </a:r>
+                    </a:p>
+                  </a:txBody>
+                  <a:tcPr/>
+                </a:tc>
+              </a:tr>
+              <a:tr h="326571">
+                <a:tc>
+                  <a:txBody>
+                    <a:bodyPr/>
+                    <a:lstStyle/>
+                    <a:p>
+                      <a:r>
+                        <a:t>Ending SoC (%)</a:t>
+                      </a:r>
+                    </a:p>
+                  </a:txBody>
+                  <a:tcPr/>
+                </a:tc>
+                <a:tc>
+                  <a:txBody>
+                    <a:bodyPr/>
+                    <a:lstStyle/>
+                    <a:p>
+                      <a:r>
                         <a:t>0.0</a:t>
                       </a:r>
                     </a:p>
@@ -3390,7 +3416,59 @@
                     <a:lstStyle/>
                     <a:p>
                       <a:r>
-                        <a:t>Ending SoC (%)</a:t>
+                        <a:t>Total distance covered (km)</a:t>
+                      </a:r>
+                    </a:p>
+                  </a:txBody>
+                  <a:tcPr/>
+                </a:tc>
+                <a:tc>
+                  <a:txBody>
+                    <a:bodyPr/>
+                    <a:lstStyle/>
+                    <a:p>
+                      <a:r>
+                        <a:t>69.78145244294669</a:t>
+                      </a:r>
+                    </a:p>
+                  </a:txBody>
+                  <a:tcPr/>
+                </a:tc>
+              </a:tr>
+              <a:tr h="326571">
+                <a:tc>
+                  <a:txBody>
+                    <a:bodyPr/>
+                    <a:lstStyle/>
+                    <a:p>
+                      <a:r>
+                        <a:t>Total energy consumption(WH/KM)</a:t>
+                      </a:r>
+                    </a:p>
+                  </a:txBody>
+                  <a:tcPr/>
+                </a:tc>
+                <a:tc>
+                  <a:txBody>
+                    <a:bodyPr/>
+                    <a:lstStyle/>
+                    <a:p>
+                      <a:r>
+                        <a:t>26.410044066355315</a:t>
+                      </a:r>
+                    </a:p>
+                  </a:txBody>
+                  <a:tcPr/>
+                </a:tc>
+              </a:tr>
+              <a:tr h="326571">
+                <a:tc>
+                  <a:txBody>
+                    <a:bodyPr/>
+                    <a:lstStyle/>
+                    <a:p>
+                      <a:r>
+                        <a:t>Total SOC consumed(%)</a:t>
                       </a:r>
                     </a:p>
                   </a:txBody>
@@ -3416,19 +3494,24 @@
                     <a:lstStyle/>
                     <a:p>
                       <a:r>
-                        <a:t>Total distance covered (in kilometers)</a:t>
-                      </a:r>
-                    </a:p>
-                  </a:txBody>
-                  <a:tcPr/>
-                </a:tc>
-                <a:tc>
-                  <a:txBody>
-                    <a:bodyPr/>
-                    <a:lstStyle/>
-                    <a:p>
-                      <a:r>
-                        <a:t>69.78145244294669</a:t>
+                        <a:t>Mode</a:t>
+                      </a:r>
+                    </a:p>
+                  </a:txBody>
+                  <a:tcPr/>
+                </a:tc>
+                <a:tc>
+                  <a:txBody>
+                    <a:bodyPr/>
+                    <a:lstStyle/>
+                    <a:p>
+                      <a:r>
+                        <a:t>Eco mode</a:t>
+                      </a:r>
+                    </a:p>
+                    <a:p>
+                      <a:r>
+                        <a:t>98.43%</a:t>
                       </a:r>
                     </a:p>
                   </a:txBody>
@@ -3442,90 +3525,7 @@
                     <a:lstStyle/>
                     <a:p>
                       <a:r>
-                        <a:t>WH/KM</a:t>
-                      </a:r>
-                    </a:p>
-                  </a:txBody>
-                  <a:tcPr/>
-                </a:tc>
-                <a:tc>
-                  <a:txBody>
-                    <a:bodyPr/>
-                    <a:lstStyle/>
-                    <a:p>
-                      <a:r>
-                        <a:t>26.410044066355315</a:t>
-                      </a:r>
-                    </a:p>
-                  </a:txBody>
-                  <a:tcPr/>
-                </a:tc>
-              </a:tr>
-              <a:tr h="326571">
-                <a:tc>
-                  <a:txBody>
-                    <a:bodyPr/>
-                    <a:lstStyle/>
-                    <a:p>
-                      <a:r>
-                        <a:t>Total SOC consumed</a:t>
-                      </a:r>
-                    </a:p>
-                  </a:txBody>
-                  <a:tcPr/>
-                </a:tc>
-                <a:tc>
-                  <a:txBody>
-                    <a:bodyPr/>
-                    <a:lstStyle/>
-                    <a:p>
-                      <a:r>
-                        <a:t>97.0</a:t>
-                      </a:r>
-                    </a:p>
-                  </a:txBody>
-                  <a:tcPr/>
-                </a:tc>
-              </a:tr>
-              <a:tr h="326571">
-                <a:tc>
-                  <a:txBody>
-                    <a:bodyPr/>
-                    <a:lstStyle/>
-                    <a:p>
-                      <a:r>
-                        <a:t>Mode</a:t>
-                      </a:r>
-                    </a:p>
-                  </a:txBody>
-                  <a:tcPr/>
-                </a:tc>
-                <a:tc>
-                  <a:txBody>
-                    <a:bodyPr/>
-                    <a:lstStyle/>
-                    <a:p>
-                      <a:r>
-                        <a:t>Eco mode</a:t>
-                      </a:r>
-                    </a:p>
-                    <a:p>
-                      <a:r>
-                        <a:t>98.43%</a:t>
-                      </a:r>
-                    </a:p>
-                  </a:txBody>
-                  <a:tcPr/>
-                </a:tc>
-              </a:tr>
-              <a:tr h="326571">
-                <a:tc>
-                  <a:txBody>
-                    <a:bodyPr/>
-                    <a:lstStyle/>
-                    <a:p>
-                      <a:r>
-                        <a:t>Peak Power</a:t>
+                        <a:t>Peak Power(kW)</a:t>
                       </a:r>
                     </a:p>
                   </a:txBody>
@@ -3551,7 +3551,7 @@
                     <a:lstStyle/>
                     <a:p>
                       <a:r>
-                        <a:t>Average Power</a:t>
+                        <a:t>Average Power(kW)</a:t>
                       </a:r>
                     </a:p>
                   </a:txBody>
@@ -3668,7 +3668,7 @@
                     <a:lstStyle/>
                     <a:p>
                       <a:r>
-                        <a:t>Total Energy Regenerated</a:t>
+                        <a:t>Total Energy Regenerated(kWh)</a:t>
                       </a:r>
                     </a:p>
                   </a:txBody>
@@ -3694,7 +3694,7 @@
                     <a:lstStyle/>
                     <a:p>
                       <a:r>
-                        <a:t>Regenerative Effectiveness</a:t>
+                        <a:t>Regenerative Effectiveness(kWh)</a:t>
                       </a:r>
                     </a:p>
                   </a:txBody>
@@ -3720,7 +3720,33 @@
                     <a:lstStyle/>
                     <a:p>
                       <a:r>
-                        <a:t>Lowest Cell Voltage</a:t>
+                        <a:t>Highest Cell Voltage(V)</a:t>
+                      </a:r>
+                    </a:p>
+                  </a:txBody>
+                  <a:tcPr/>
+                </a:tc>
+                <a:tc>
+                  <a:txBody>
+                    <a:bodyPr/>
+                    <a:lstStyle/>
+                    <a:p>
+                      <a:r>
+                        <a:t>3.339</a:t>
+                      </a:r>
+                    </a:p>
+                  </a:txBody>
+                  <a:tcPr/>
+                </a:tc>
+              </a:tr>
+              <a:tr h="326571">
+                <a:tc>
+                  <a:txBody>
+                    <a:bodyPr/>
+                    <a:lstStyle/>
+                    <a:p>
+                      <a:r>
+                        <a:t>Lowest Cell Voltage(V)</a:t>
                       </a:r>
                     </a:p>
                   </a:txBody>
@@ -3746,19 +3772,19 @@
                     <a:lstStyle/>
                     <a:p>
                       <a:r>
-                        <a:t>Highest Cell Voltage</a:t>
-                      </a:r>
-                    </a:p>
-                  </a:txBody>
-                  <a:tcPr/>
-                </a:tc>
-                <a:tc>
-                  <a:txBody>
-                    <a:bodyPr/>
-                    <a:lstStyle/>
-                    <a:p>
-                      <a:r>
-                        <a:t>3.339</a:t>
+                        <a:t>Difference in Cell Voltage(V)</a:t>
+                      </a:r>
+                    </a:p>
+                  </a:txBody>
+                  <a:tcPr/>
+                </a:tc>
+                <a:tc>
+                  <a:txBody>
+                    <a:bodyPr/>
+                    <a:lstStyle/>
+                    <a:p>
+                      <a:r>
+                        <a:t>0.3540000000000001</a:t>
                       </a:r>
                     </a:p>
                   </a:txBody>
@@ -3772,19 +3798,19 @@
                     <a:lstStyle/>
                     <a:p>
                       <a:r>
-                        <a:t>Difference in Cell Voltage</a:t>
-                      </a:r>
-                    </a:p>
-                  </a:txBody>
-                  <a:tcPr/>
-                </a:tc>
-                <a:tc>
-                  <a:txBody>
-                    <a:bodyPr/>
-                    <a:lstStyle/>
-                    <a:p>
-                      <a:r>
-                        <a:t>0.3540000000000001</a:t>
+                        <a:t>Minimum Temperature(C)</a:t>
+                      </a:r>
+                    </a:p>
+                  </a:txBody>
+                  <a:tcPr/>
+                </a:tc>
+                <a:tc>
+                  <a:txBody>
+                    <a:bodyPr/>
+                    <a:lstStyle/>
+                    <a:p>
+                      <a:r>
+                        <a:t>23.0</a:t>
                       </a:r>
                     </a:p>
                   </a:txBody>
@@ -3798,19 +3824,19 @@
                     <a:lstStyle/>
                     <a:p>
                       <a:r>
-                        <a:t>Minimum Temperature</a:t>
-                      </a:r>
-                    </a:p>
-                  </a:txBody>
-                  <a:tcPr/>
-                </a:tc>
-                <a:tc>
-                  <a:txBody>
-                    <a:bodyPr/>
-                    <a:lstStyle/>
-                    <a:p>
-                      <a:r>
-                        <a:t>23.0</a:t>
+                        <a:t>Maximum Temperature(C)</a:t>
+                      </a:r>
+                    </a:p>
+                  </a:txBody>
+                  <a:tcPr/>
+                </a:tc>
+                <a:tc>
+                  <a:txBody>
+                    <a:bodyPr/>
+                    <a:lstStyle/>
+                    <a:p>
+                      <a:r>
+                        <a:t>44.0</a:t>
                       </a:r>
                     </a:p>
                   </a:txBody>
@@ -3824,19 +3850,19 @@
                     <a:lstStyle/>
                     <a:p>
                       <a:r>
-                        <a:t>Maximum Temperature</a:t>
-                      </a:r>
-                    </a:p>
-                  </a:txBody>
-                  <a:tcPr/>
-                </a:tc>
-                <a:tc>
-                  <a:txBody>
-                    <a:bodyPr/>
-                    <a:lstStyle/>
-                    <a:p>
-                      <a:r>
-                        <a:t>44.0</a:t>
+                        <a:t>Difference in Temperature(C)</a:t>
+                      </a:r>
+                    </a:p>
+                  </a:txBody>
+                  <a:tcPr/>
+                </a:tc>
+                <a:tc>
+                  <a:txBody>
+                    <a:bodyPr/>
+                    <a:lstStyle/>
+                    <a:p>
+                      <a:r>
+                        <a:t>21.0</a:t>
                       </a:r>
                     </a:p>
                   </a:txBody>
@@ -3850,19 +3876,19 @@
                     <a:lstStyle/>
                     <a:p>
                       <a:r>
-                        <a:t>Difference in Temperature</a:t>
-                      </a:r>
-                    </a:p>
-                  </a:txBody>
-                  <a:tcPr/>
-                </a:tc>
-                <a:tc>
-                  <a:txBody>
-                    <a:bodyPr/>
-                    <a:lstStyle/>
-                    <a:p>
-                      <a:r>
-                        <a:t>nan</a:t>
+                        <a:t>Maximum Fet Temperature-BMS(C)</a:t>
+                      </a:r>
+                    </a:p>
+                  </a:txBody>
+                  <a:tcPr/>
+                </a:tc>
+                <a:tc>
+                  <a:txBody>
+                    <a:bodyPr/>
+                    <a:lstStyle/>
+                    <a:p>
+                      <a:r>
+                        <a:t>58.0</a:t>
                       </a:r>
                     </a:p>
                   </a:txBody>
@@ -3876,19 +3902,19 @@
                     <a:lstStyle/>
                     <a:p>
                       <a:r>
-                        <a:t>Maximum Fet Temperature</a:t>
-                      </a:r>
-                    </a:p>
-                  </a:txBody>
-                  <a:tcPr/>
-                </a:tc>
-                <a:tc>
-                  <a:txBody>
-                    <a:bodyPr/>
-                    <a:lstStyle/>
-                    <a:p>
-                      <a:r>
-                        <a:t>58.0</a:t>
+                        <a:t>Maximum Afe Temperature-BMS(C)</a:t>
+                      </a:r>
+                    </a:p>
+                  </a:txBody>
+                  <a:tcPr/>
+                </a:tc>
+                <a:tc>
+                  <a:txBody>
+                    <a:bodyPr/>
+                    <a:lstStyle/>
+                    <a:p>
+                      <a:r>
+                        <a:t>62.0</a:t>
                       </a:r>
                     </a:p>
                   </a:txBody>
@@ -3902,19 +3928,19 @@
                     <a:lstStyle/>
                     <a:p>
                       <a:r>
-                        <a:t>Maximum Afe Temperature</a:t>
-                      </a:r>
-                    </a:p>
-                  </a:txBody>
-                  <a:tcPr/>
-                </a:tc>
-                <a:tc>
-                  <a:txBody>
-                    <a:bodyPr/>
-                    <a:lstStyle/>
-                    <a:p>
-                      <a:r>
-                        <a:t>62.0</a:t>
+                        <a:t>Maximum PCB Temperature-BMS(C)</a:t>
+                      </a:r>
+                    </a:p>
+                  </a:txBody>
+                  <a:tcPr/>
+                </a:tc>
+                <a:tc>
+                  <a:txBody>
+                    <a:bodyPr/>
+                    <a:lstStyle/>
+                    <a:p>
+                      <a:r>
+                        <a:t>57.0</a:t>
                       </a:r>
                     </a:p>
                   </a:txBody>
@@ -3928,33 +3954,7 @@
                     <a:lstStyle/>
                     <a:p>
                       <a:r>
-                        <a:t>Maximum PCB Temperature</a:t>
-                      </a:r>
-                    </a:p>
-                  </a:txBody>
-                  <a:tcPr/>
-                </a:tc>
-                <a:tc>
-                  <a:txBody>
-                    <a:bodyPr/>
-                    <a:lstStyle/>
-                    <a:p>
-                      <a:r>
-                        <a:t>57.0</a:t>
-                      </a:r>
-                    </a:p>
-                  </a:txBody>
-                  <a:tcPr/>
-                </a:tc>
-              </a:tr>
-              <a:tr h="326571">
-                <a:tc>
-                  <a:txBody>
-                    <a:bodyPr/>
-                    <a:lstStyle/>
-                    <a:p>
-                      <a:r>
-                        <a:t>Maximum MCU Temperature</a:t>
+                        <a:t>Maximum MCU Temperature(C)</a:t>
                       </a:r>
                     </a:p>
                   </a:txBody>
@@ -3980,7 +3980,7 @@
                     <a:lstStyle/>
                     <a:p>
                       <a:r>
-                        <a:t>Maximum Motor Temperature</a:t>
+                        <a:t>Maximum Motor Temperature(C)</a:t>
                       </a:r>
                     </a:p>
                   </a:txBody>
@@ -4097,7 +4097,7 @@
                     <a:lstStyle/>
                     <a:p>
                       <a:r>
-                        <a:t>Abnormal Motor Temperature Detected</a:t>
+                        <a:t>Abnormal Motor Temperature Detected(C)</a:t>
                       </a:r>
                     </a:p>
                   </a:txBody>
@@ -4123,7 +4123,7 @@
                     <a:lstStyle/>
                     <a:p>
                       <a:r>
-                        <a:t>lowest cell temp</a:t>
+                        <a:t>highest cell temp(C)</a:t>
                       </a:r>
                     </a:p>
                   </a:txBody>
@@ -4149,7 +4149,7 @@
                     <a:lstStyle/>
                     <a:p>
                       <a:r>
-                        <a:t>highest cell temp</a:t>
+                        <a:t>lowest cell temp(C)</a:t>
                       </a:r>
                     </a:p>
                   </a:txBody>
@@ -4175,7 +4175,7 @@
                     <a:lstStyle/>
                     <a:p>
                       <a:r>
-                        <a:t>Difference between Highest and Lowest Cell Temperature at 100% SOC</a:t>
+                        <a:t>Difference between Highest and Lowest Cell Temperature at 100% SOC(C)</a:t>
                       </a:r>
                     </a:p>
                   </a:txBody>
@@ -4201,19 +4201,19 @@
                     <a:lstStyle/>
                     <a:p>
                       <a:r>
-                        <a:t>Maximum BMS Temperature in C</a:t>
-                      </a:r>
-                    </a:p>
-                  </a:txBody>
-                  <a:tcPr/>
-                </a:tc>
-                <a:tc>
-                  <a:txBody>
-                    <a:bodyPr/>
-                    <a:lstStyle/>
-                    <a:p>
-                      <a:r>
-                        <a:t>58.0</a:t>
+                        <a:t>Battery Voltage(V)</a:t>
+                      </a:r>
+                    </a:p>
+                  </a:txBody>
+                  <a:tcPr/>
+                </a:tc>
+                <a:tc>
+                  <a:txBody>
+                    <a:bodyPr/>
+                    <a:lstStyle/>
+                    <a:p>
+                      <a:r>
+                        <a:t>55.0</a:t>
                       </a:r>
                     </a:p>
                   </a:txBody>
@@ -4227,19 +4227,19 @@
                     <a:lstStyle/>
                     <a:p>
                       <a:r>
-                        <a:t>Battery Voltage</a:t>
-                      </a:r>
-                    </a:p>
-                  </a:txBody>
-                  <a:tcPr/>
-                </a:tc>
-                <a:tc>
-                  <a:txBody>
-                    <a:bodyPr/>
-                    <a:lstStyle/>
-                    <a:p>
-                      <a:r>
-                        <a:t>5.5</a:t>
+                        <a:t>Total energy charged(kWh)</a:t>
+                      </a:r>
+                    </a:p>
+                  </a:txBody>
+                  <a:tcPr/>
+                </a:tc>
+                <a:tc>
+                  <a:txBody>
+                    <a:bodyPr/>
+                    <a:lstStyle/>
+                    <a:p>
+                      <a:r>
+                        <a:t>1.9709301486111113</a:t>
                       </a:r>
                     </a:p>
                   </a:txBody>
@@ -4253,19 +4253,19 @@
                     <a:lstStyle/>
                     <a:p>
                       <a:r>
-                        <a:t>Total energy charged in kWh</a:t>
-                      </a:r>
-                    </a:p>
-                  </a:txBody>
-                  <a:tcPr/>
-                </a:tc>
-                <a:tc>
-                  <a:txBody>
-                    <a:bodyPr/>
-                    <a:lstStyle/>
-                    <a:p>
-                      <a:r>
-                        <a:t>0.19709301486111114</a:t>
+                        <a:t>Electricity consumption units(kW)</a:t>
+                      </a:r>
+                    </a:p>
+                  </a:txBody>
+                  <a:tcPr/>
+                </a:tc>
+                <a:tc>
+                  <a:txBody>
+                    <a:bodyPr/>
+                    <a:lstStyle/>
+                    <a:p>
+                      <a:r>
+                        <a:t>6.687194293836812e-08</a:t>
                       </a:r>
                     </a:p>
                   </a:txBody>
@@ -4279,19 +4279,19 @@
                     <a:lstStyle/>
                     <a:p>
                       <a:r>
-                        <a:t>Electricity consumption units in kW</a:t>
-                      </a:r>
-                    </a:p>
-                  </a:txBody>
-                  <a:tcPr/>
-                </a:tc>
-                <a:tc>
-                  <a:txBody>
-                    <a:bodyPr/>
-                    <a:lstStyle/>
-                    <a:p>
-                      <a:r>
-                        <a:t>6.687194293836812e-09</a:t>
+                        <a:t>Idling time percentage</a:t>
+                      </a:r>
+                    </a:p>
+                  </a:txBody>
+                  <a:tcPr/>
+                </a:tc>
+                <a:tc>
+                  <a:txBody>
+                    <a:bodyPr/>
+                    <a:lstStyle/>
+                    <a:p>
+                      <a:r>
+                        <a:t>18.293057153816648</a:t>
                       </a:r>
                     </a:p>
                   </a:txBody>
@@ -4305,19 +4305,19 @@
                     <a:lstStyle/>
                     <a:p>
                       <a:r>
-                        <a:t>Idling time percentage</a:t>
-                      </a:r>
-                    </a:p>
-                  </a:txBody>
-                  <a:tcPr/>
-                </a:tc>
-                <a:tc>
-                  <a:txBody>
-                    <a:bodyPr/>
-                    <a:lstStyle/>
-                    <a:p>
-                      <a:r>
-                        <a:t>17.45556834164429</a:t>
+                        <a:t>Time spent in 0-10 km/h</a:t>
+                      </a:r>
+                    </a:p>
+                  </a:txBody>
+                  <a:tcPr/>
+                </a:tc>
+                <a:tc>
+                  <a:txBody>
+                    <a:bodyPr/>
+                    <a:lstStyle/>
+                    <a:p>
+                      <a:r>
+                        <a:t>4.760260836210203</a:t>
                       </a:r>
                     </a:p>
                   </a:txBody>
@@ -4331,19 +4331,19 @@
                     <a:lstStyle/>
                     <a:p>
                       <a:r>
-                        <a:t>Time spent in 0-10 km/h</a:t>
-                      </a:r>
-                    </a:p>
-                  </a:txBody>
-                  <a:tcPr/>
-                </a:tc>
-                <a:tc>
-                  <a:txBody>
-                    <a:bodyPr/>
-                    <a:lstStyle/>
-                    <a:p>
-                      <a:r>
-                        <a:t>22.21582917785449</a:t>
+                        <a:t>Time spent in 10-20 km/h</a:t>
+                      </a:r>
+                    </a:p>
+                  </a:txBody>
+                  <a:tcPr/>
+                </a:tc>
+                <a:tc>
+                  <a:txBody>
+                    <a:bodyPr/>
+                    <a:lstStyle/>
+                    <a:p>
+                      <a:r>
+                        <a:t>1.6634701444828026</a:t>
                       </a:r>
                     </a:p>
                   </a:txBody>
@@ -4357,19 +4357,19 @@
                     <a:lstStyle/>
                     <a:p>
                       <a:r>
-                        <a:t>Time spent in 10-20 km/h</a:t>
-                      </a:r>
-                    </a:p>
-                  </a:txBody>
-                  <a:tcPr/>
-                </a:tc>
-                <a:tc>
-                  <a:txBody>
-                    <a:bodyPr/>
-                    <a:lstStyle/>
-                    <a:p>
-                      <a:r>
-                        <a:t>1.6647487533563483</a:t>
+                        <a:t>Time spent in 20-30 km/h</a:t>
+                      </a:r>
+                    </a:p>
+                  </a:txBody>
+                  <a:tcPr/>
+                </a:tc>
+                <a:tc>
+                  <a:txBody>
+                    <a:bodyPr/>
+                    <a:lstStyle/>
+                    <a:p>
+                      <a:r>
+                        <a:t>3.11724843370413</a:t>
                       </a:r>
                     </a:p>
                   </a:txBody>
@@ -4383,19 +4383,19 @@
                     <a:lstStyle/>
                     <a:p>
                       <a:r>
-                        <a:t>Time spent in 20-30 km/h</a:t>
-                      </a:r>
-                    </a:p>
-                  </a:txBody>
-                  <a:tcPr/>
-                </a:tc>
-                <a:tc>
-                  <a:txBody>
-                    <a:bodyPr/>
-                    <a:lstStyle/>
-                    <a:p>
-                      <a:r>
-                        <a:t>3.1223628691983123</a:t>
+                        <a:t>Time spent in 30-40 km/h</a:t>
+                      </a:r>
+                    </a:p>
+                  </a:txBody>
+                  <a:tcPr/>
+                </a:tc>
+                <a:tc>
+                  <a:txBody>
+                    <a:bodyPr/>
+                    <a:lstStyle/>
+                    <a:p>
+                      <a:r>
+                        <a:t>41.70950006393044</a:t>
                       </a:r>
                     </a:p>
                   </a:txBody>
@@ -4409,19 +4409,19 @@
                     <a:lstStyle/>
                     <a:p>
                       <a:r>
-                        <a:t>Time spent in 30-40 km/h</a:t>
-                      </a:r>
-                    </a:p>
-                  </a:txBody>
-                  <a:tcPr/>
-                </a:tc>
-                <a:tc>
-                  <a:txBody>
-                    <a:bodyPr/>
-                    <a:lstStyle/>
-                    <a:p>
-                      <a:r>
-                        <a:t>41.71205728167753</a:t>
+                        <a:t>Time spent in 40-50 km/h</a:t>
+                      </a:r>
+                    </a:p>
+                  </a:txBody>
+                  <a:tcPr/>
+                </a:tc>
+                <a:tc>
+                  <a:txBody>
+                    <a:bodyPr/>
+                    <a:lstStyle/>
+                    <a:p>
+                      <a:r>
+                        <a:t>28.172867919703364</a:t>
                       </a:r>
                     </a:p>
                   </a:txBody>
@@ -4526,19 +4526,19 @@
                     <a:lstStyle/>
                     <a:p>
                       <a:r>
-                        <a:t>Time spent in 40-50 km/h</a:t>
-                      </a:r>
-                    </a:p>
-                  </a:txBody>
-                  <a:tcPr/>
-                </a:tc>
-                <a:tc>
-                  <a:txBody>
-                    <a:bodyPr/>
-                    <a:lstStyle/>
-                    <a:p>
-                      <a:r>
-                        <a:t>30.447513105740953</a:t>
+                        <a:t>Time spent in 50-60 km/h</a:t>
+                      </a:r>
+                    </a:p>
+                  </a:txBody>
+                  <a:tcPr/>
+                </a:tc>
+                <a:tc>
+                  <a:txBody>
+                    <a:bodyPr/>
+                    <a:lstStyle/>
+                    <a:p>
+                      <a:r>
+                        <a:t>0.0</a:t>
                       </a:r>
                     </a:p>
                   </a:txBody>
@@ -4552,7 +4552,7 @@
                     <a:lstStyle/>
                     <a:p>
                       <a:r>
-                        <a:t>Time spent in 50-60 km/h</a:t>
+                        <a:t>Time spent in 60-70 km/h</a:t>
                       </a:r>
                     </a:p>
                   </a:txBody>
@@ -4578,7 +4578,7 @@
                     <a:lstStyle/>
                     <a:p>
                       <a:r>
-                        <a:t>Time spent in 60-70 km/h</a:t>
+                        <a:t>Time spent in 70-80 km/h</a:t>
                       </a:r>
                     </a:p>
                   </a:txBody>
@@ -4602,15 +4602,23 @@
                   <a:txBody>
                     <a:bodyPr/>
                     <a:lstStyle/>
-                    <a:p/>
-                  </a:txBody>
-                  <a:tcPr/>
-                </a:tc>
-                <a:tc>
-                  <a:txBody>
-                    <a:bodyPr/>
-                    <a:lstStyle/>
-                    <a:p/>
+                    <a:p>
+                      <a:r>
+                        <a:t>Time spent in 80-90 km/h</a:t>
+                      </a:r>
+                    </a:p>
+                  </a:txBody>
+                  <a:tcPr/>
+                </a:tc>
+                <a:tc>
+                  <a:txBody>
+                    <a:bodyPr/>
+                    <a:lstStyle/>
+                    <a:p>
+                      <a:r>
+                        <a:t>0.0</a:t>
+                      </a:r>
+                    </a:p>
                   </a:txBody>
                   <a:tcPr/>
                 </a:tc>

</xml_diff>

<commit_message>
Made changes with regenerative effectiveness, Rectified the anomaly in the Total SOC consumed
</commit_message>
<xml_diff>
--- a/Automationdashboard/MAIN_FOLDER/Automation_Dashboard_Batterywise/V4/D11_03_2024/B3_B03_13.15_15.30/analysis_B3_B03_13.15_15.30.pptx
+++ b/Automationdashboard/MAIN_FOLDER/Automation_Dashboard_Batterywise/V4/D11_03_2024/B3_B03_13.15_15.30/analysis_B3_B03_13.15_15.30.pptx
@@ -3376,6 +3376,32 @@
                     <a:lstStyle/>
                     <a:p>
                       <a:r>
+                        <a:t>97.0</a:t>
+                      </a:r>
+                    </a:p>
+                  </a:txBody>
+                  <a:tcPr/>
+                </a:tc>
+              </a:tr>
+              <a:tr h="326571">
+                <a:tc>
+                  <a:txBody>
+                    <a:bodyPr/>
+                    <a:lstStyle/>
+                    <a:p>
+                      <a:r>
+                        <a:t>Ending SoC (%)</a:t>
+                      </a:r>
+                    </a:p>
+                  </a:txBody>
+                  <a:tcPr/>
+                </a:tc>
+                <a:tc>
+                  <a:txBody>
+                    <a:bodyPr/>
+                    <a:lstStyle/>
+                    <a:p>
+                      <a:r>
                         <a:t>0.0</a:t>
                       </a:r>
                     </a:p>
@@ -3390,7 +3416,59 @@
                     <a:lstStyle/>
                     <a:p>
                       <a:r>
-                        <a:t>Ending SoC (%)</a:t>
+                        <a:t>Total distance covered (km)</a:t>
+                      </a:r>
+                    </a:p>
+                  </a:txBody>
+                  <a:tcPr/>
+                </a:tc>
+                <a:tc>
+                  <a:txBody>
+                    <a:bodyPr/>
+                    <a:lstStyle/>
+                    <a:p>
+                      <a:r>
+                        <a:t>69.78145244294669</a:t>
+                      </a:r>
+                    </a:p>
+                  </a:txBody>
+                  <a:tcPr/>
+                </a:tc>
+              </a:tr>
+              <a:tr h="326571">
+                <a:tc>
+                  <a:txBody>
+                    <a:bodyPr/>
+                    <a:lstStyle/>
+                    <a:p>
+                      <a:r>
+                        <a:t>Total energy consumption(WH/KM)</a:t>
+                      </a:r>
+                    </a:p>
+                  </a:txBody>
+                  <a:tcPr/>
+                </a:tc>
+                <a:tc>
+                  <a:txBody>
+                    <a:bodyPr/>
+                    <a:lstStyle/>
+                    <a:p>
+                      <a:r>
+                        <a:t>26.410044066355315</a:t>
+                      </a:r>
+                    </a:p>
+                  </a:txBody>
+                  <a:tcPr/>
+                </a:tc>
+              </a:tr>
+              <a:tr h="326571">
+                <a:tc>
+                  <a:txBody>
+                    <a:bodyPr/>
+                    <a:lstStyle/>
+                    <a:p>
+                      <a:r>
+                        <a:t>Total SOC consumed(%)</a:t>
                       </a:r>
                     </a:p>
                   </a:txBody>
@@ -3416,19 +3494,24 @@
                     <a:lstStyle/>
                     <a:p>
                       <a:r>
-                        <a:t>Total distance covered (in kilometers)</a:t>
-                      </a:r>
-                    </a:p>
-                  </a:txBody>
-                  <a:tcPr/>
-                </a:tc>
-                <a:tc>
-                  <a:txBody>
-                    <a:bodyPr/>
-                    <a:lstStyle/>
-                    <a:p>
-                      <a:r>
-                        <a:t>69.78145244294669</a:t>
+                        <a:t>Mode</a:t>
+                      </a:r>
+                    </a:p>
+                  </a:txBody>
+                  <a:tcPr/>
+                </a:tc>
+                <a:tc>
+                  <a:txBody>
+                    <a:bodyPr/>
+                    <a:lstStyle/>
+                    <a:p>
+                      <a:r>
+                        <a:t>Eco mode</a:t>
+                      </a:r>
+                    </a:p>
+                    <a:p>
+                      <a:r>
+                        <a:t>98.43%</a:t>
                       </a:r>
                     </a:p>
                   </a:txBody>
@@ -3442,90 +3525,7 @@
                     <a:lstStyle/>
                     <a:p>
                       <a:r>
-                        <a:t>WH/KM</a:t>
-                      </a:r>
-                    </a:p>
-                  </a:txBody>
-                  <a:tcPr/>
-                </a:tc>
-                <a:tc>
-                  <a:txBody>
-                    <a:bodyPr/>
-                    <a:lstStyle/>
-                    <a:p>
-                      <a:r>
-                        <a:t>26.410044066355315</a:t>
-                      </a:r>
-                    </a:p>
-                  </a:txBody>
-                  <a:tcPr/>
-                </a:tc>
-              </a:tr>
-              <a:tr h="326571">
-                <a:tc>
-                  <a:txBody>
-                    <a:bodyPr/>
-                    <a:lstStyle/>
-                    <a:p>
-                      <a:r>
-                        <a:t>Total SOC consumed</a:t>
-                      </a:r>
-                    </a:p>
-                  </a:txBody>
-                  <a:tcPr/>
-                </a:tc>
-                <a:tc>
-                  <a:txBody>
-                    <a:bodyPr/>
-                    <a:lstStyle/>
-                    <a:p>
-                      <a:r>
-                        <a:t>97.0</a:t>
-                      </a:r>
-                    </a:p>
-                  </a:txBody>
-                  <a:tcPr/>
-                </a:tc>
-              </a:tr>
-              <a:tr h="326571">
-                <a:tc>
-                  <a:txBody>
-                    <a:bodyPr/>
-                    <a:lstStyle/>
-                    <a:p>
-                      <a:r>
-                        <a:t>Mode</a:t>
-                      </a:r>
-                    </a:p>
-                  </a:txBody>
-                  <a:tcPr/>
-                </a:tc>
-                <a:tc>
-                  <a:txBody>
-                    <a:bodyPr/>
-                    <a:lstStyle/>
-                    <a:p>
-                      <a:r>
-                        <a:t>Eco mode</a:t>
-                      </a:r>
-                    </a:p>
-                    <a:p>
-                      <a:r>
-                        <a:t>98.43%</a:t>
-                      </a:r>
-                    </a:p>
-                  </a:txBody>
-                  <a:tcPr/>
-                </a:tc>
-              </a:tr>
-              <a:tr h="326571">
-                <a:tc>
-                  <a:txBody>
-                    <a:bodyPr/>
-                    <a:lstStyle/>
-                    <a:p>
-                      <a:r>
-                        <a:t>Peak Power</a:t>
+                        <a:t>Peak Power(kW)</a:t>
                       </a:r>
                     </a:p>
                   </a:txBody>
@@ -3551,7 +3551,7 @@
                     <a:lstStyle/>
                     <a:p>
                       <a:r>
-                        <a:t>Average Power</a:t>
+                        <a:t>Average Power(kW)</a:t>
                       </a:r>
                     </a:p>
                   </a:txBody>
@@ -3668,7 +3668,7 @@
                     <a:lstStyle/>
                     <a:p>
                       <a:r>
-                        <a:t>Total Energy Regenerated</a:t>
+                        <a:t>Total Energy Regenerated(kWh)</a:t>
                       </a:r>
                     </a:p>
                   </a:txBody>
@@ -3694,19 +3694,19 @@
                     <a:lstStyle/>
                     <a:p>
                       <a:r>
-                        <a:t>Regenerative Effectiveness</a:t>
-                      </a:r>
-                    </a:p>
-                  </a:txBody>
-                  <a:tcPr/>
-                </a:tc>
-                <a:tc>
-                  <a:txBody>
-                    <a:bodyPr/>
-                    <a:lstStyle/>
-                    <a:p>
-                      <a:r>
-                        <a:t>-1.2011099517154418</a:t>
+                        <a:t>Regenerative Effectiveness(%)</a:t>
+                      </a:r>
+                    </a:p>
+                  </a:txBody>
+                  <a:tcPr/>
+                </a:tc>
+                <a:tc>
+                  <a:txBody>
+                    <a:bodyPr/>
+                    <a:lstStyle/>
+                    <a:p>
+                      <a:r>
+                        <a:t>1.2011099517154418</a:t>
                       </a:r>
                     </a:p>
                   </a:txBody>
@@ -3720,7 +3720,33 @@
                     <a:lstStyle/>
                     <a:p>
                       <a:r>
-                        <a:t>Lowest Cell Voltage</a:t>
+                        <a:t>Highest Cell Voltage(V)</a:t>
+                      </a:r>
+                    </a:p>
+                  </a:txBody>
+                  <a:tcPr/>
+                </a:tc>
+                <a:tc>
+                  <a:txBody>
+                    <a:bodyPr/>
+                    <a:lstStyle/>
+                    <a:p>
+                      <a:r>
+                        <a:t>3.339</a:t>
+                      </a:r>
+                    </a:p>
+                  </a:txBody>
+                  <a:tcPr/>
+                </a:tc>
+              </a:tr>
+              <a:tr h="326571">
+                <a:tc>
+                  <a:txBody>
+                    <a:bodyPr/>
+                    <a:lstStyle/>
+                    <a:p>
+                      <a:r>
+                        <a:t>Lowest Cell Voltage(V)</a:t>
                       </a:r>
                     </a:p>
                   </a:txBody>
@@ -3746,19 +3772,19 @@
                     <a:lstStyle/>
                     <a:p>
                       <a:r>
-                        <a:t>Highest Cell Voltage</a:t>
-                      </a:r>
-                    </a:p>
-                  </a:txBody>
-                  <a:tcPr/>
-                </a:tc>
-                <a:tc>
-                  <a:txBody>
-                    <a:bodyPr/>
-                    <a:lstStyle/>
-                    <a:p>
-                      <a:r>
-                        <a:t>3.339</a:t>
+                        <a:t>Difference in Cell Voltage(V)</a:t>
+                      </a:r>
+                    </a:p>
+                  </a:txBody>
+                  <a:tcPr/>
+                </a:tc>
+                <a:tc>
+                  <a:txBody>
+                    <a:bodyPr/>
+                    <a:lstStyle/>
+                    <a:p>
+                      <a:r>
+                        <a:t>0.3540000000000001</a:t>
                       </a:r>
                     </a:p>
                   </a:txBody>
@@ -3772,19 +3798,19 @@
                     <a:lstStyle/>
                     <a:p>
                       <a:r>
-                        <a:t>Difference in Cell Voltage</a:t>
-                      </a:r>
-                    </a:p>
-                  </a:txBody>
-                  <a:tcPr/>
-                </a:tc>
-                <a:tc>
-                  <a:txBody>
-                    <a:bodyPr/>
-                    <a:lstStyle/>
-                    <a:p>
-                      <a:r>
-                        <a:t>0.3540000000000001</a:t>
+                        <a:t>Minimum Temperature(C)</a:t>
+                      </a:r>
+                    </a:p>
+                  </a:txBody>
+                  <a:tcPr/>
+                </a:tc>
+                <a:tc>
+                  <a:txBody>
+                    <a:bodyPr/>
+                    <a:lstStyle/>
+                    <a:p>
+                      <a:r>
+                        <a:t>23.0</a:t>
                       </a:r>
                     </a:p>
                   </a:txBody>
@@ -3798,19 +3824,19 @@
                     <a:lstStyle/>
                     <a:p>
                       <a:r>
-                        <a:t>Minimum Temperature</a:t>
-                      </a:r>
-                    </a:p>
-                  </a:txBody>
-                  <a:tcPr/>
-                </a:tc>
-                <a:tc>
-                  <a:txBody>
-                    <a:bodyPr/>
-                    <a:lstStyle/>
-                    <a:p>
-                      <a:r>
-                        <a:t>23.0</a:t>
+                        <a:t>Maximum Temperature(C)</a:t>
+                      </a:r>
+                    </a:p>
+                  </a:txBody>
+                  <a:tcPr/>
+                </a:tc>
+                <a:tc>
+                  <a:txBody>
+                    <a:bodyPr/>
+                    <a:lstStyle/>
+                    <a:p>
+                      <a:r>
+                        <a:t>44.0</a:t>
                       </a:r>
                     </a:p>
                   </a:txBody>
@@ -3824,19 +3850,19 @@
                     <a:lstStyle/>
                     <a:p>
                       <a:r>
-                        <a:t>Maximum Temperature</a:t>
-                      </a:r>
-                    </a:p>
-                  </a:txBody>
-                  <a:tcPr/>
-                </a:tc>
-                <a:tc>
-                  <a:txBody>
-                    <a:bodyPr/>
-                    <a:lstStyle/>
-                    <a:p>
-                      <a:r>
-                        <a:t>44.0</a:t>
+                        <a:t>Difference in Temperature(C)</a:t>
+                      </a:r>
+                    </a:p>
+                  </a:txBody>
+                  <a:tcPr/>
+                </a:tc>
+                <a:tc>
+                  <a:txBody>
+                    <a:bodyPr/>
+                    <a:lstStyle/>
+                    <a:p>
+                      <a:r>
+                        <a:t>21.0</a:t>
                       </a:r>
                     </a:p>
                   </a:txBody>
@@ -3850,19 +3876,19 @@
                     <a:lstStyle/>
                     <a:p>
                       <a:r>
-                        <a:t>Difference in Temperature</a:t>
-                      </a:r>
-                    </a:p>
-                  </a:txBody>
-                  <a:tcPr/>
-                </a:tc>
-                <a:tc>
-                  <a:txBody>
-                    <a:bodyPr/>
-                    <a:lstStyle/>
-                    <a:p>
-                      <a:r>
-                        <a:t>nan</a:t>
+                        <a:t>Maximum Fet Temperature-BMS(C)</a:t>
+                      </a:r>
+                    </a:p>
+                  </a:txBody>
+                  <a:tcPr/>
+                </a:tc>
+                <a:tc>
+                  <a:txBody>
+                    <a:bodyPr/>
+                    <a:lstStyle/>
+                    <a:p>
+                      <a:r>
+                        <a:t>58.0</a:t>
                       </a:r>
                     </a:p>
                   </a:txBody>
@@ -3876,19 +3902,19 @@
                     <a:lstStyle/>
                     <a:p>
                       <a:r>
-                        <a:t>Maximum Fet Temperature</a:t>
-                      </a:r>
-                    </a:p>
-                  </a:txBody>
-                  <a:tcPr/>
-                </a:tc>
-                <a:tc>
-                  <a:txBody>
-                    <a:bodyPr/>
-                    <a:lstStyle/>
-                    <a:p>
-                      <a:r>
-                        <a:t>58.0</a:t>
+                        <a:t>Maximum Afe Temperature-BMS(C)</a:t>
+                      </a:r>
+                    </a:p>
+                  </a:txBody>
+                  <a:tcPr/>
+                </a:tc>
+                <a:tc>
+                  <a:txBody>
+                    <a:bodyPr/>
+                    <a:lstStyle/>
+                    <a:p>
+                      <a:r>
+                        <a:t>62.0</a:t>
                       </a:r>
                     </a:p>
                   </a:txBody>
@@ -3902,19 +3928,19 @@
                     <a:lstStyle/>
                     <a:p>
                       <a:r>
-                        <a:t>Maximum Afe Temperature</a:t>
-                      </a:r>
-                    </a:p>
-                  </a:txBody>
-                  <a:tcPr/>
-                </a:tc>
-                <a:tc>
-                  <a:txBody>
-                    <a:bodyPr/>
-                    <a:lstStyle/>
-                    <a:p>
-                      <a:r>
-                        <a:t>62.0</a:t>
+                        <a:t>Maximum PCB Temperature-BMS(C)</a:t>
+                      </a:r>
+                    </a:p>
+                  </a:txBody>
+                  <a:tcPr/>
+                </a:tc>
+                <a:tc>
+                  <a:txBody>
+                    <a:bodyPr/>
+                    <a:lstStyle/>
+                    <a:p>
+                      <a:r>
+                        <a:t>57.0</a:t>
                       </a:r>
                     </a:p>
                   </a:txBody>
@@ -3928,33 +3954,7 @@
                     <a:lstStyle/>
                     <a:p>
                       <a:r>
-                        <a:t>Maximum PCB Temperature</a:t>
-                      </a:r>
-                    </a:p>
-                  </a:txBody>
-                  <a:tcPr/>
-                </a:tc>
-                <a:tc>
-                  <a:txBody>
-                    <a:bodyPr/>
-                    <a:lstStyle/>
-                    <a:p>
-                      <a:r>
-                        <a:t>57.0</a:t>
-                      </a:r>
-                    </a:p>
-                  </a:txBody>
-                  <a:tcPr/>
-                </a:tc>
-              </a:tr>
-              <a:tr h="326571">
-                <a:tc>
-                  <a:txBody>
-                    <a:bodyPr/>
-                    <a:lstStyle/>
-                    <a:p>
-                      <a:r>
-                        <a:t>Maximum MCU Temperature</a:t>
+                        <a:t>Maximum MCU Temperature(C)</a:t>
                       </a:r>
                     </a:p>
                   </a:txBody>
@@ -3980,7 +3980,7 @@
                     <a:lstStyle/>
                     <a:p>
                       <a:r>
-                        <a:t>Maximum Motor Temperature</a:t>
+                        <a:t>Maximum Motor Temperature(C)</a:t>
                       </a:r>
                     </a:p>
                   </a:txBody>
@@ -4097,7 +4097,7 @@
                     <a:lstStyle/>
                     <a:p>
                       <a:r>
-                        <a:t>Abnormal Motor Temperature Detected</a:t>
+                        <a:t>Abnormal Motor Temperature Detected(C)</a:t>
                       </a:r>
                     </a:p>
                   </a:txBody>
@@ -4123,7 +4123,7 @@
                     <a:lstStyle/>
                     <a:p>
                       <a:r>
-                        <a:t>lowest cell temp</a:t>
+                        <a:t>highest cell temp(C)</a:t>
                       </a:r>
                     </a:p>
                   </a:txBody>
@@ -4149,7 +4149,7 @@
                     <a:lstStyle/>
                     <a:p>
                       <a:r>
-                        <a:t>highest cell temp</a:t>
+                        <a:t>lowest cell temp(C)</a:t>
                       </a:r>
                     </a:p>
                   </a:txBody>
@@ -4175,7 +4175,7 @@
                     <a:lstStyle/>
                     <a:p>
                       <a:r>
-                        <a:t>Difference between Highest and Lowest Cell Temperature at 100% SOC</a:t>
+                        <a:t>Difference between Highest and Lowest Cell Temperature at 100% SOC(C)</a:t>
                       </a:r>
                     </a:p>
                   </a:txBody>
@@ -4201,19 +4201,19 @@
                     <a:lstStyle/>
                     <a:p>
                       <a:r>
-                        <a:t>Maximum BMS Temperature in C</a:t>
-                      </a:r>
-                    </a:p>
-                  </a:txBody>
-                  <a:tcPr/>
-                </a:tc>
-                <a:tc>
-                  <a:txBody>
-                    <a:bodyPr/>
-                    <a:lstStyle/>
-                    <a:p>
-                      <a:r>
-                        <a:t>58.0</a:t>
+                        <a:t>Battery Voltage(V)</a:t>
+                      </a:r>
+                    </a:p>
+                  </a:txBody>
+                  <a:tcPr/>
+                </a:tc>
+                <a:tc>
+                  <a:txBody>
+                    <a:bodyPr/>
+                    <a:lstStyle/>
+                    <a:p>
+                      <a:r>
+                        <a:t>55.0</a:t>
                       </a:r>
                     </a:p>
                   </a:txBody>
@@ -4227,19 +4227,19 @@
                     <a:lstStyle/>
                     <a:p>
                       <a:r>
-                        <a:t>Battery Voltage</a:t>
-                      </a:r>
-                    </a:p>
-                  </a:txBody>
-                  <a:tcPr/>
-                </a:tc>
-                <a:tc>
-                  <a:txBody>
-                    <a:bodyPr/>
-                    <a:lstStyle/>
-                    <a:p>
-                      <a:r>
-                        <a:t>5.5</a:t>
+                        <a:t>Total energy charged(kWh)</a:t>
+                      </a:r>
+                    </a:p>
+                  </a:txBody>
+                  <a:tcPr/>
+                </a:tc>
+                <a:tc>
+                  <a:txBody>
+                    <a:bodyPr/>
+                    <a:lstStyle/>
+                    <a:p>
+                      <a:r>
+                        <a:t>1.9709301486111113</a:t>
                       </a:r>
                     </a:p>
                   </a:txBody>
@@ -4253,19 +4253,19 @@
                     <a:lstStyle/>
                     <a:p>
                       <a:r>
-                        <a:t>Total energy charged in kWh</a:t>
-                      </a:r>
-                    </a:p>
-                  </a:txBody>
-                  <a:tcPr/>
-                </a:tc>
-                <a:tc>
-                  <a:txBody>
-                    <a:bodyPr/>
-                    <a:lstStyle/>
-                    <a:p>
-                      <a:r>
-                        <a:t>0.19709301486111114</a:t>
+                        <a:t>Electricity consumption units(kW)</a:t>
+                      </a:r>
+                    </a:p>
+                  </a:txBody>
+                  <a:tcPr/>
+                </a:tc>
+                <a:tc>
+                  <a:txBody>
+                    <a:bodyPr/>
+                    <a:lstStyle/>
+                    <a:p>
+                      <a:r>
+                        <a:t>6.687194293836812e-08</a:t>
                       </a:r>
                     </a:p>
                   </a:txBody>
@@ -4279,19 +4279,19 @@
                     <a:lstStyle/>
                     <a:p>
                       <a:r>
-                        <a:t>Electricity consumption units in kW</a:t>
-                      </a:r>
-                    </a:p>
-                  </a:txBody>
-                  <a:tcPr/>
-                </a:tc>
-                <a:tc>
-                  <a:txBody>
-                    <a:bodyPr/>
-                    <a:lstStyle/>
-                    <a:p>
-                      <a:r>
-                        <a:t>6.687194293836812e-09</a:t>
+                        <a:t>Idling time percentage</a:t>
+                      </a:r>
+                    </a:p>
+                  </a:txBody>
+                  <a:tcPr/>
+                </a:tc>
+                <a:tc>
+                  <a:txBody>
+                    <a:bodyPr/>
+                    <a:lstStyle/>
+                    <a:p>
+                      <a:r>
+                        <a:t>18.293057153816648</a:t>
                       </a:r>
                     </a:p>
                   </a:txBody>
@@ -4305,19 +4305,19 @@
                     <a:lstStyle/>
                     <a:p>
                       <a:r>
-                        <a:t>Idling time percentage</a:t>
-                      </a:r>
-                    </a:p>
-                  </a:txBody>
-                  <a:tcPr/>
-                </a:tc>
-                <a:tc>
-                  <a:txBody>
-                    <a:bodyPr/>
-                    <a:lstStyle/>
-                    <a:p>
-                      <a:r>
-                        <a:t>17.45556834164429</a:t>
+                        <a:t>Time spent in 0-10 km/h</a:t>
+                      </a:r>
+                    </a:p>
+                  </a:txBody>
+                  <a:tcPr/>
+                </a:tc>
+                <a:tc>
+                  <a:txBody>
+                    <a:bodyPr/>
+                    <a:lstStyle/>
+                    <a:p>
+                      <a:r>
+                        <a:t>4.760260836210203</a:t>
                       </a:r>
                     </a:p>
                   </a:txBody>
@@ -4331,19 +4331,19 @@
                     <a:lstStyle/>
                     <a:p>
                       <a:r>
-                        <a:t>Time spent in 0-10 km/h</a:t>
-                      </a:r>
-                    </a:p>
-                  </a:txBody>
-                  <a:tcPr/>
-                </a:tc>
-                <a:tc>
-                  <a:txBody>
-                    <a:bodyPr/>
-                    <a:lstStyle/>
-                    <a:p>
-                      <a:r>
-                        <a:t>22.21582917785449</a:t>
+                        <a:t>Time spent in 10-20 km/h</a:t>
+                      </a:r>
+                    </a:p>
+                  </a:txBody>
+                  <a:tcPr/>
+                </a:tc>
+                <a:tc>
+                  <a:txBody>
+                    <a:bodyPr/>
+                    <a:lstStyle/>
+                    <a:p>
+                      <a:r>
+                        <a:t>1.6634701444828026</a:t>
                       </a:r>
                     </a:p>
                   </a:txBody>
@@ -4357,19 +4357,19 @@
                     <a:lstStyle/>
                     <a:p>
                       <a:r>
-                        <a:t>Time spent in 10-20 km/h</a:t>
-                      </a:r>
-                    </a:p>
-                  </a:txBody>
-                  <a:tcPr/>
-                </a:tc>
-                <a:tc>
-                  <a:txBody>
-                    <a:bodyPr/>
-                    <a:lstStyle/>
-                    <a:p>
-                      <a:r>
-                        <a:t>1.6647487533563483</a:t>
+                        <a:t>Time spent in 20-30 km/h</a:t>
+                      </a:r>
+                    </a:p>
+                  </a:txBody>
+                  <a:tcPr/>
+                </a:tc>
+                <a:tc>
+                  <a:txBody>
+                    <a:bodyPr/>
+                    <a:lstStyle/>
+                    <a:p>
+                      <a:r>
+                        <a:t>3.11724843370413</a:t>
                       </a:r>
                     </a:p>
                   </a:txBody>
@@ -4383,19 +4383,19 @@
                     <a:lstStyle/>
                     <a:p>
                       <a:r>
-                        <a:t>Time spent in 20-30 km/h</a:t>
-                      </a:r>
-                    </a:p>
-                  </a:txBody>
-                  <a:tcPr/>
-                </a:tc>
-                <a:tc>
-                  <a:txBody>
-                    <a:bodyPr/>
-                    <a:lstStyle/>
-                    <a:p>
-                      <a:r>
-                        <a:t>3.1223628691983123</a:t>
+                        <a:t>Time spent in 30-40 km/h</a:t>
+                      </a:r>
+                    </a:p>
+                  </a:txBody>
+                  <a:tcPr/>
+                </a:tc>
+                <a:tc>
+                  <a:txBody>
+                    <a:bodyPr/>
+                    <a:lstStyle/>
+                    <a:p>
+                      <a:r>
+                        <a:t>41.70950006393044</a:t>
                       </a:r>
                     </a:p>
                   </a:txBody>
@@ -4409,19 +4409,19 @@
                     <a:lstStyle/>
                     <a:p>
                       <a:r>
-                        <a:t>Time spent in 30-40 km/h</a:t>
-                      </a:r>
-                    </a:p>
-                  </a:txBody>
-                  <a:tcPr/>
-                </a:tc>
-                <a:tc>
-                  <a:txBody>
-                    <a:bodyPr/>
-                    <a:lstStyle/>
-                    <a:p>
-                      <a:r>
-                        <a:t>41.71205728167753</a:t>
+                        <a:t>Time spent in 40-50 km/h</a:t>
+                      </a:r>
+                    </a:p>
+                  </a:txBody>
+                  <a:tcPr/>
+                </a:tc>
+                <a:tc>
+                  <a:txBody>
+                    <a:bodyPr/>
+                    <a:lstStyle/>
+                    <a:p>
+                      <a:r>
+                        <a:t>28.172867919703364</a:t>
                       </a:r>
                     </a:p>
                   </a:txBody>
@@ -4526,19 +4526,19 @@
                     <a:lstStyle/>
                     <a:p>
                       <a:r>
-                        <a:t>Time spent in 40-50 km/h</a:t>
-                      </a:r>
-                    </a:p>
-                  </a:txBody>
-                  <a:tcPr/>
-                </a:tc>
-                <a:tc>
-                  <a:txBody>
-                    <a:bodyPr/>
-                    <a:lstStyle/>
-                    <a:p>
-                      <a:r>
-                        <a:t>30.447513105740953</a:t>
+                        <a:t>Time spent in 50-60 km/h</a:t>
+                      </a:r>
+                    </a:p>
+                  </a:txBody>
+                  <a:tcPr/>
+                </a:tc>
+                <a:tc>
+                  <a:txBody>
+                    <a:bodyPr/>
+                    <a:lstStyle/>
+                    <a:p>
+                      <a:r>
+                        <a:t>0.0</a:t>
                       </a:r>
                     </a:p>
                   </a:txBody>
@@ -4552,7 +4552,7 @@
                     <a:lstStyle/>
                     <a:p>
                       <a:r>
-                        <a:t>Time spent in 50-60 km/h</a:t>
+                        <a:t>Time spent in 60-70 km/h</a:t>
                       </a:r>
                     </a:p>
                   </a:txBody>
@@ -4578,7 +4578,7 @@
                     <a:lstStyle/>
                     <a:p>
                       <a:r>
-                        <a:t>Time spent in 60-70 km/h</a:t>
+                        <a:t>Time spent in 70-80 km/h</a:t>
                       </a:r>
                     </a:p>
                   </a:txBody>
@@ -4602,15 +4602,23 @@
                   <a:txBody>
                     <a:bodyPr/>
                     <a:lstStyle/>
-                    <a:p/>
-                  </a:txBody>
-                  <a:tcPr/>
-                </a:tc>
-                <a:tc>
-                  <a:txBody>
-                    <a:bodyPr/>
-                    <a:lstStyle/>
-                    <a:p/>
+                    <a:p>
+                      <a:r>
+                        <a:t>Time spent in 80-90 km/h</a:t>
+                      </a:r>
+                    </a:p>
+                  </a:txBody>
+                  <a:tcPr/>
+                </a:tc>
+                <a:tc>
+                  <a:txBody>
+                    <a:bodyPr/>
+                    <a:lstStyle/>
+                    <a:p>
+                      <a:r>
+                        <a:t>0.0</a:t>
+                      </a:r>
+                    </a:p>
                   </a:txBody>
                   <a:tcPr/>
                 </a:tc>

</xml_diff>